<commit_message>
Commit with README & Small Changes
</commit_message>
<xml_diff>
--- a/Facebook_Authentication_&_Graph_API.pptx
+++ b/Facebook_Authentication_&_Graph_API.pptx
@@ -28,30 +28,30 @@
   <p:notesSz cx="6858000" cy="9144000"/>
   <p:embeddedFontLst>
     <p:embeddedFont>
-      <p:font typeface="Muli" panose="020B0604020202020204" charset="0"/>
+      <p:font typeface="Calibri" panose="020F0502020204030204" pitchFamily="34" charset="0"/>
       <p:regular r:id="rId18"/>
-      <p:italic r:id="rId19"/>
-    </p:embeddedFont>
-    <p:embeddedFont>
-      <p:font typeface="Calibri" panose="020F0502020204030204" pitchFamily="34" charset="0"/>
-      <p:regular r:id="rId20"/>
-      <p:bold r:id="rId21"/>
-      <p:italic r:id="rId22"/>
-      <p:boldItalic r:id="rId23"/>
+      <p:bold r:id="rId19"/>
+      <p:italic r:id="rId20"/>
+      <p:boldItalic r:id="rId21"/>
     </p:embeddedFont>
     <p:embeddedFont>
       <p:font typeface="Segoe WP" panose="020B0502040204020203" pitchFamily="34" charset="0"/>
-      <p:regular r:id="rId24"/>
-      <p:bold r:id="rId25"/>
+      <p:regular r:id="rId22"/>
+      <p:bold r:id="rId23"/>
     </p:embeddedFont>
     <p:embeddedFont>
       <p:font typeface="Calibri Light" panose="020F0302020204030204" pitchFamily="34" charset="0"/>
-      <p:regular r:id="rId26"/>
-      <p:italic r:id="rId27"/>
+      <p:regular r:id="rId24"/>
+      <p:italic r:id="rId25"/>
     </p:embeddedFont>
     <p:embeddedFont>
       <p:font typeface="Nixie One" panose="020B0604020202020204" charset="0"/>
-      <p:regular r:id="rId28"/>
+      <p:regular r:id="rId26"/>
+    </p:embeddedFont>
+    <p:embeddedFont>
+      <p:font typeface="Muli" panose="020B0604020202020204" charset="0"/>
+      <p:regular r:id="rId27"/>
+      <p:italic r:id="rId28"/>
     </p:embeddedFont>
   </p:embeddedFontLst>
   <p:defaultTextStyle>
@@ -30941,19 +30941,6 @@
               </a:buClr>
             </a:pPr>
             <a:r>
-              <a:rPr lang="en-US" sz="2800" b="1" dirty="0">
-                <a:solidFill>
-                  <a:srgbClr val="132A3D"/>
-                </a:solidFill>
-                <a:latin typeface="Segoe WP" panose="020B0502040204020203" pitchFamily="34" charset="0"/>
-                <a:ea typeface="Muli"/>
-                <a:cs typeface="Segoe WP" panose="020B0502040204020203" pitchFamily="34" charset="0"/>
-                <a:sym typeface="Muli"/>
-                <a:hlinkClick r:id="rId3"/>
-              </a:rPr>
-              <a:t>h</a:t>
-            </a:r>
-            <a:r>
               <a:rPr lang="en-US" sz="2400" b="1" dirty="0">
                 <a:solidFill>
                   <a:srgbClr val="132A3D"/>
@@ -30964,7 +30951,7 @@
                 <a:sym typeface="Muli"/>
                 <a:hlinkClick r:id="rId3"/>
               </a:rPr>
-              <a:t>ttps://</a:t>
+              <a:t>https://</a:t>
             </a:r>
             <a:r>
               <a:rPr lang="en-US" sz="2400" b="1" dirty="0" smtClean="0">
@@ -30977,7 +30964,7 @@
                 <a:sym typeface="Muli"/>
                 <a:hlinkClick r:id="rId3"/>
               </a:rPr>
-              <a:t>github.com/Sourov00/FAuthAndroid.git</a:t>
+              <a:t>github.com/TanvirSourov/FAuthAndroid.git</a:t>
             </a:r>
             <a:r>
               <a:rPr lang="en-US" sz="2400" b="1" dirty="0" smtClean="0">
@@ -30991,7 +30978,7 @@
               </a:rPr>
               <a:t> </a:t>
             </a:r>
-            <a:endParaRPr lang="en-US" sz="2400" b="1" i="1" dirty="0" smtClean="0">
+            <a:endParaRPr lang="en-US" sz="2400" b="1" dirty="0" smtClean="0">
               <a:solidFill>
                 <a:srgbClr val="132A3D"/>
               </a:solidFill>
@@ -31144,15 +31131,7 @@
                   <a:srgbClr val="132A3D"/>
                 </a:solidFill>
               </a:rPr>
-              <a:t>uestions</a:t>
-            </a:r>
-            <a:r>
-              <a:rPr lang="en" sz="2700" b="1" dirty="0" smtClean="0">
-                <a:solidFill>
-                  <a:srgbClr val="132A3D"/>
-                </a:solidFill>
-              </a:rPr>
-              <a:t>???</a:t>
+              <a:t>uestions???</a:t>
             </a:r>
             <a:endParaRPr lang="en" sz="2700" b="1" dirty="0">
               <a:solidFill>
@@ -36080,29 +36059,8 @@
                 <a:cs typeface="Segoe WP" panose="020B0502040204020203" pitchFamily="34" charset="0"/>
                 <a:sym typeface="Muli"/>
               </a:rPr>
-              <a:t>(at top right corner)</a:t>
+              <a:t>(at top right corner).</a:t>
             </a:r>
-            <a:r>
-              <a:rPr lang="en-US" sz="1800" dirty="0" smtClean="0">
-                <a:solidFill>
-                  <a:srgbClr val="132A3D"/>
-                </a:solidFill>
-                <a:latin typeface="Segoe WP" panose="020B0502040204020203" pitchFamily="34" charset="0"/>
-                <a:ea typeface="Muli"/>
-                <a:cs typeface="Segoe WP" panose="020B0502040204020203" pitchFamily="34" charset="0"/>
-                <a:sym typeface="Muli"/>
-              </a:rPr>
-              <a:t>.</a:t>
-            </a:r>
-            <a:endParaRPr lang="en-US" sz="1800" dirty="0" smtClean="0">
-              <a:solidFill>
-                <a:srgbClr val="132A3D"/>
-              </a:solidFill>
-              <a:latin typeface="Segoe WP" panose="020B0502040204020203" pitchFamily="34" charset="0"/>
-              <a:ea typeface="Muli"/>
-              <a:cs typeface="Segoe WP" panose="020B0502040204020203" pitchFamily="34" charset="0"/>
-              <a:sym typeface="Muli"/>
-            </a:endParaRPr>
           </a:p>
         </p:txBody>
       </p:sp>

</xml_diff>